<commit_message>
PCA and TimeSeries notes added
</commit_message>
<xml_diff>
--- a/Machine-Learning/4.12 PCA/0 PCA-Algo-Example.pptx
+++ b/Machine-Learning/4.12 PCA/0 PCA-Algo-Example.pptx
@@ -245,7 +245,7 @@
           <a:p>
             <a:fld id="{DEE881C5-C40C-46AE-B142-F7F3F0A1C896}" type="datetimeFigureOut">
               <a:rPr lang="en-US" smtClean="0"/>
-              <a:t>6/22/2019</a:t>
+              <a:t>6/23/2019</a:t>
             </a:fld>
             <a:endParaRPr lang="en-US"/>
           </a:p>
@@ -653,7 +653,7 @@
           <a:p>
             <a:fld id="{051F961C-2C06-44AD-B09C-3FDB0903E3DD}" type="datetimeFigureOut">
               <a:rPr lang="en-US" smtClean="0"/>
-              <a:t>6/22/2019</a:t>
+              <a:t>6/23/2019</a:t>
             </a:fld>
             <a:endParaRPr lang="en-US"/>
           </a:p>
@@ -1011,7 +1011,7 @@
           <a:p>
             <a:fld id="{051F961C-2C06-44AD-B09C-3FDB0903E3DD}" type="datetimeFigureOut">
               <a:rPr lang="en-US" smtClean="0"/>
-              <a:t>6/22/2019</a:t>
+              <a:t>6/23/2019</a:t>
             </a:fld>
             <a:endParaRPr lang="en-US"/>
           </a:p>
@@ -1185,7 +1185,7 @@
           <a:p>
             <a:fld id="{051F961C-2C06-44AD-B09C-3FDB0903E3DD}" type="datetimeFigureOut">
               <a:rPr lang="en-US" smtClean="0"/>
-              <a:t>6/22/2019</a:t>
+              <a:t>6/23/2019</a:t>
             </a:fld>
             <a:endParaRPr lang="en-US"/>
           </a:p>
@@ -1419,7 +1419,7 @@
           <a:p>
             <a:fld id="{051F961C-2C06-44AD-B09C-3FDB0903E3DD}" type="datetimeFigureOut">
               <a:rPr lang="en-US" smtClean="0"/>
-              <a:t>6/22/2019</a:t>
+              <a:t>6/23/2019</a:t>
             </a:fld>
             <a:endParaRPr lang="en-US"/>
           </a:p>
@@ -1687,7 +1687,7 @@
           <a:p>
             <a:fld id="{051F961C-2C06-44AD-B09C-3FDB0903E3DD}" type="datetimeFigureOut">
               <a:rPr lang="en-US" smtClean="0"/>
-              <a:t>6/22/2019</a:t>
+              <a:t>6/23/2019</a:t>
             </a:fld>
             <a:endParaRPr lang="en-US"/>
           </a:p>
@@ -1906,7 +1906,7 @@
           <a:p>
             <a:fld id="{051F961C-2C06-44AD-B09C-3FDB0903E3DD}" type="datetimeFigureOut">
               <a:rPr lang="en-US" smtClean="0"/>
-              <a:t>6/22/2019</a:t>
+              <a:t>6/23/2019</a:t>
             </a:fld>
             <a:endParaRPr lang="en-US"/>
           </a:p>
@@ -2257,7 +2257,7 @@
           <a:p>
             <a:fld id="{051F961C-2C06-44AD-B09C-3FDB0903E3DD}" type="datetimeFigureOut">
               <a:rPr lang="en-US" smtClean="0"/>
-              <a:t>6/22/2019</a:t>
+              <a:t>6/23/2019</a:t>
             </a:fld>
             <a:endParaRPr lang="en-US"/>
           </a:p>
@@ -2488,7 +2488,7 @@
           <a:p>
             <a:fld id="{051F961C-2C06-44AD-B09C-3FDB0903E3DD}" type="datetimeFigureOut">
               <a:rPr lang="en-US" smtClean="0"/>
-              <a:t>6/22/2019</a:t>
+              <a:t>6/23/2019</a:t>
             </a:fld>
             <a:endParaRPr lang="en-US"/>
           </a:p>
@@ -2628,7 +2628,7 @@
           <a:p>
             <a:fld id="{051F961C-2C06-44AD-B09C-3FDB0903E3DD}" type="datetimeFigureOut">
               <a:rPr lang="en-US" smtClean="0"/>
-              <a:t>6/22/2019</a:t>
+              <a:t>6/23/2019</a:t>
             </a:fld>
             <a:endParaRPr lang="en-US"/>
           </a:p>
@@ -2904,7 +2904,7 @@
           <a:p>
             <a:fld id="{051F961C-2C06-44AD-B09C-3FDB0903E3DD}" type="datetimeFigureOut">
               <a:rPr lang="en-US" smtClean="0"/>
-              <a:t>6/22/2019</a:t>
+              <a:t>6/23/2019</a:t>
             </a:fld>
             <a:endParaRPr lang="en-US"/>
           </a:p>
@@ -3310,7 +3310,7 @@
           <a:p>
             <a:fld id="{051F961C-2C06-44AD-B09C-3FDB0903E3DD}" type="datetimeFigureOut">
               <a:rPr lang="en-US" smtClean="0"/>
-              <a:t>6/22/2019</a:t>
+              <a:t>6/23/2019</a:t>
             </a:fld>
             <a:endParaRPr lang="en-US"/>
           </a:p>
@@ -3646,7 +3646,7 @@
           <a:p>
             <a:fld id="{051F961C-2C06-44AD-B09C-3FDB0903E3DD}" type="datetimeFigureOut">
               <a:rPr lang="en-US" smtClean="0"/>
-              <a:t>6/22/2019</a:t>
+              <a:t>6/23/2019</a:t>
             </a:fld>
             <a:endParaRPr lang="en-US"/>
           </a:p>
@@ -6323,7 +6323,7 @@
           <p:nvPr>
             <p:extLst>
               <p:ext uri="{D42A27DB-BD31-4B8C-83A1-F6EECF244321}">
-                <p14:modId xmlns:p14="http://schemas.microsoft.com/office/powerpoint/2010/main" val="1407303619"/>
+                <p14:modId xmlns:p14="http://schemas.microsoft.com/office/powerpoint/2010/main" val="2302086674"/>
               </p:ext>
             </p:extLst>
           </p:nvPr>
@@ -6356,7 +6356,7 @@
                       <a:pPr algn="ctr"/>
                       <a:r>
                         <a:rPr lang="en-US" sz="1800" b="0" baseline="0" dirty="0"/>
-                        <a:t>- 6.77</a:t>
+                        <a:t>- .`677</a:t>
                       </a:r>
                     </a:p>
                   </a:txBody>
@@ -6549,7 +6549,7 @@
             </a:r>
             <a:r>
               <a:rPr lang="en-US" b="1" dirty="0"/>
-              <a:t> (1.2480) &lt;  </a:t>
+              <a:t> (1.2480) &gt;  </a:t>
             </a:r>
             <a:r>
               <a:rPr lang="el-GR" b="1" dirty="0"/>

</xml_diff>